<commit_message>
finish up work for today
</commit_message>
<xml_diff>
--- a/FlowCharts.pptx
+++ b/FlowCharts.pptx
@@ -296,7 +296,7 @@
           <a:p>
             <a:fld id="{90507A79-6E98-4423-9484-6C57CF9C8B9C}" type="datetimeFigureOut">
               <a:rPr lang="en-US" smtClean="0"/>
-              <a:t>11/19/2015</a:t>
+              <a:t>12/5/2015</a:t>
             </a:fld>
             <a:endParaRPr lang="en-US"/>
           </a:p>
@@ -466,7 +466,7 @@
           <a:p>
             <a:fld id="{90507A79-6E98-4423-9484-6C57CF9C8B9C}" type="datetimeFigureOut">
               <a:rPr lang="en-US" smtClean="0"/>
-              <a:t>11/19/2015</a:t>
+              <a:t>12/5/2015</a:t>
             </a:fld>
             <a:endParaRPr lang="en-US"/>
           </a:p>
@@ -646,7 +646,7 @@
           <a:p>
             <a:fld id="{90507A79-6E98-4423-9484-6C57CF9C8B9C}" type="datetimeFigureOut">
               <a:rPr lang="en-US" smtClean="0"/>
-              <a:t>11/19/2015</a:t>
+              <a:t>12/5/2015</a:t>
             </a:fld>
             <a:endParaRPr lang="en-US"/>
           </a:p>
@@ -816,7 +816,7 @@
           <a:p>
             <a:fld id="{90507A79-6E98-4423-9484-6C57CF9C8B9C}" type="datetimeFigureOut">
               <a:rPr lang="en-US" smtClean="0"/>
-              <a:t>11/19/2015</a:t>
+              <a:t>12/5/2015</a:t>
             </a:fld>
             <a:endParaRPr lang="en-US"/>
           </a:p>
@@ -1062,7 +1062,7 @@
           <a:p>
             <a:fld id="{90507A79-6E98-4423-9484-6C57CF9C8B9C}" type="datetimeFigureOut">
               <a:rPr lang="en-US" smtClean="0"/>
-              <a:t>11/19/2015</a:t>
+              <a:t>12/5/2015</a:t>
             </a:fld>
             <a:endParaRPr lang="en-US"/>
           </a:p>
@@ -1350,7 +1350,7 @@
           <a:p>
             <a:fld id="{90507A79-6E98-4423-9484-6C57CF9C8B9C}" type="datetimeFigureOut">
               <a:rPr lang="en-US" smtClean="0"/>
-              <a:t>11/19/2015</a:t>
+              <a:t>12/5/2015</a:t>
             </a:fld>
             <a:endParaRPr lang="en-US"/>
           </a:p>
@@ -1772,7 +1772,7 @@
           <a:p>
             <a:fld id="{90507A79-6E98-4423-9484-6C57CF9C8B9C}" type="datetimeFigureOut">
               <a:rPr lang="en-US" smtClean="0"/>
-              <a:t>11/19/2015</a:t>
+              <a:t>12/5/2015</a:t>
             </a:fld>
             <a:endParaRPr lang="en-US"/>
           </a:p>
@@ -1890,7 +1890,7 @@
           <a:p>
             <a:fld id="{90507A79-6E98-4423-9484-6C57CF9C8B9C}" type="datetimeFigureOut">
               <a:rPr lang="en-US" smtClean="0"/>
-              <a:t>11/19/2015</a:t>
+              <a:t>12/5/2015</a:t>
             </a:fld>
             <a:endParaRPr lang="en-US"/>
           </a:p>
@@ -1985,7 +1985,7 @@
           <a:p>
             <a:fld id="{90507A79-6E98-4423-9484-6C57CF9C8B9C}" type="datetimeFigureOut">
               <a:rPr lang="en-US" smtClean="0"/>
-              <a:t>11/19/2015</a:t>
+              <a:t>12/5/2015</a:t>
             </a:fld>
             <a:endParaRPr lang="en-US"/>
           </a:p>
@@ -2262,7 +2262,7 @@
           <a:p>
             <a:fld id="{90507A79-6E98-4423-9484-6C57CF9C8B9C}" type="datetimeFigureOut">
               <a:rPr lang="en-US" smtClean="0"/>
-              <a:t>11/19/2015</a:t>
+              <a:t>12/5/2015</a:t>
             </a:fld>
             <a:endParaRPr lang="en-US"/>
           </a:p>
@@ -2515,7 +2515,7 @@
           <a:p>
             <a:fld id="{90507A79-6E98-4423-9484-6C57CF9C8B9C}" type="datetimeFigureOut">
               <a:rPr lang="en-US" smtClean="0"/>
-              <a:t>11/19/2015</a:t>
+              <a:t>12/5/2015</a:t>
             </a:fld>
             <a:endParaRPr lang="en-US"/>
           </a:p>
@@ -2728,7 +2728,7 @@
           <a:p>
             <a:fld id="{90507A79-6E98-4423-9484-6C57CF9C8B9C}" type="datetimeFigureOut">
               <a:rPr lang="en-US" smtClean="0"/>
-              <a:t>11/19/2015</a:t>
+              <a:t>12/5/2015</a:t>
             </a:fld>
             <a:endParaRPr lang="en-US"/>
           </a:p>

</xml_diff>